<commit_message>
GK_UPD_04 Graphics and Components
</commit_message>
<xml_diff>
--- a/GKPPROJ/GK_LOGOS.pptx
+++ b/GKPPROJ/GK_LOGOS.pptx
@@ -6,6 +6,7 @@
   </p:sldMasterIdLst>
   <p:sldIdLst>
     <p:sldId id="256" r:id="rId2"/>
+    <p:sldId id="258" r:id="rId3"/>
   </p:sldIdLst>
   <p:sldSz cx="12192000" cy="6858000"/>
   <p:notesSz cx="6858000" cy="9144000"/>
@@ -104,6 +105,11 @@
       </a:defRPr>
     </a:lvl9pPr>
   </p:defaultTextStyle>
+  <p:extLst>
+    <p:ext uri="{EFAFB233-063F-42B5-8137-9DF3F51BA10A}">
+      <p15:sldGuideLst xmlns:p15="http://schemas.microsoft.com/office/powerpoint/2012/main"/>
+    </p:ext>
+  </p:extLst>
 </p:presentation>
 </file>
 
@@ -272,7 +278,7 @@
           <a:p>
             <a:fld id="{72EA7947-E287-4738-8C82-07CE4F01EF03}" type="datetime2">
               <a:rPr lang="en-US" smtClean="0"/>
-              <a:t>Tuesday, October 13, 2020</a:t>
+              <a:t>Friday, October 23, 2020</a:t>
             </a:fld>
             <a:endParaRPr lang="en-US" dirty="0"/>
           </a:p>
@@ -1308,7 +1314,7 @@
           <a:p>
             <a:fld id="{EE2EBD84-71F4-4271-8C46-0D47C0A9B12E}" type="datetime2">
               <a:rPr lang="en-US" smtClean="0"/>
-              <a:t>Tuesday, October 13, 2020</a:t>
+              <a:t>Friday, October 23, 2020</a:t>
             </a:fld>
             <a:endParaRPr lang="en-US"/>
           </a:p>
@@ -1519,7 +1525,7 @@
           <a:p>
             <a:fld id="{ABAE0CE1-F450-4107-B2CB-17B18F8A3F4A}" type="datetime2">
               <a:rPr lang="en-US" smtClean="0"/>
-              <a:t>Tuesday, October 13, 2020</a:t>
+              <a:t>Friday, October 23, 2020</a:t>
             </a:fld>
             <a:endParaRPr lang="en-US"/>
           </a:p>
@@ -2184,7 +2190,7 @@
           <a:p>
             <a:fld id="{6FE8C025-CD7A-4966-867E-81CF82B15267}" type="datetime2">
               <a:rPr lang="en-US" smtClean="0"/>
-              <a:t>Tuesday, October 13, 2020</a:t>
+              <a:t>Friday, October 23, 2020</a:t>
             </a:fld>
             <a:endParaRPr lang="en-US"/>
           </a:p>
@@ -2804,7 +2810,7 @@
           <a:p>
             <a:fld id="{FE809929-0719-4517-94D6-FDF7F99E70F6}" type="datetime2">
               <a:rPr lang="en-US" smtClean="0"/>
-              <a:t>Tuesday, October 13, 2020</a:t>
+              <a:t>Friday, October 23, 2020</a:t>
             </a:fld>
             <a:endParaRPr lang="en-US"/>
           </a:p>
@@ -3922,7 +3928,7 @@
           <a:p>
             <a:fld id="{20E95673-5512-4AAA-9AEB-E00C61EC65D5}" type="datetime2">
               <a:rPr lang="en-US" smtClean="0"/>
-              <a:t>Tuesday, October 13, 2020</a:t>
+              <a:t>Friday, October 23, 2020</a:t>
             </a:fld>
             <a:endParaRPr lang="en-US"/>
           </a:p>
@@ -4469,7 +4475,7 @@
           <a:p>
             <a:fld id="{C13138FA-2E87-4873-8BBA-13E447C9A99A}" type="datetime2">
               <a:rPr lang="en-US" smtClean="0"/>
-              <a:t>Tuesday, October 13, 2020</a:t>
+              <a:t>Friday, October 23, 2020</a:t>
             </a:fld>
             <a:endParaRPr lang="en-US"/>
           </a:p>
@@ -4630,7 +4636,7 @@
           <a:p>
             <a:fld id="{D75BB40A-97BD-4BFB-B639-0BFF95FDE8B7}" type="datetime2">
               <a:rPr lang="en-US" smtClean="0"/>
-              <a:t>Tuesday, October 13, 2020</a:t>
+              <a:t>Friday, October 23, 2020</a:t>
             </a:fld>
             <a:endParaRPr lang="en-US"/>
           </a:p>
@@ -5665,7 +5671,7 @@
           <a:p>
             <a:fld id="{9EE9E0E3-ECF6-4CFE-8698-AEFEBCECC3C0}" type="datetime2">
               <a:rPr lang="en-US" smtClean="0"/>
-              <a:t>Tuesday, October 13, 2020</a:t>
+              <a:t>Friday, October 23, 2020</a:t>
             </a:fld>
             <a:endParaRPr lang="en-US"/>
           </a:p>
@@ -6311,7 +6317,7 @@
           <a:p>
             <a:fld id="{251462FC-960E-4740-921F-B36862979F21}" type="datetime2">
               <a:rPr lang="en-US" smtClean="0"/>
-              <a:t>Tuesday, October 13, 2020</a:t>
+              <a:t>Friday, October 23, 2020</a:t>
             </a:fld>
             <a:endParaRPr lang="en-US"/>
           </a:p>
@@ -7075,7 +7081,7 @@
           <a:p>
             <a:fld id="{E50BC9E2-CB44-4C05-9BB5-496C18A241E0}" type="datetime2">
               <a:rPr lang="en-US" smtClean="0"/>
-              <a:t>Tuesday, October 13, 2020</a:t>
+              <a:t>Friday, October 23, 2020</a:t>
             </a:fld>
             <a:endParaRPr lang="en-US"/>
           </a:p>
@@ -7328,7 +7334,7 @@
           <a:p>
             <a:fld id="{246CB39B-5F4C-4A7E-9BE3-AAFD45576D16}" type="datetime2">
               <a:rPr lang="en-US" smtClean="0"/>
-              <a:t>Tuesday, October 13, 2020</a:t>
+              <a:t>Friday, October 23, 2020</a:t>
             </a:fld>
             <a:endParaRPr lang="en-US" dirty="0"/>
           </a:p>
@@ -8490,8 +8496,8 @@
         </p:nvSpPr>
         <p:spPr>
           <a:xfrm>
-            <a:off x="2373863" y="492241"/>
-            <a:ext cx="7938392" cy="3154710"/>
+            <a:off x="1152919" y="547490"/>
+            <a:ext cx="9467656" cy="3154710"/>
           </a:xfrm>
           <a:prstGeom prst="rect">
             <a:avLst/>
@@ -8519,6 +8525,178 @@
             <a:pPr algn="ctr"/>
             <a:r>
               <a:rPr lang="en-US" sz="19900" b="0" cap="none" spc="0" dirty="0">
+                <a:ln w="19050">
+                  <a:solidFill>
+                    <a:schemeClr val="bg1"/>
+                  </a:solidFill>
+                </a:ln>
+                <a:gradFill>
+                  <a:gsLst>
+                    <a:gs pos="87000">
+                      <a:srgbClr val="FFC000"/>
+                    </a:gs>
+                    <a:gs pos="0">
+                      <a:srgbClr val="FFC000"/>
+                    </a:gs>
+                    <a:gs pos="64000">
+                      <a:srgbClr val="C00000"/>
+                    </a:gs>
+                    <a:gs pos="21000">
+                      <a:srgbClr val="FF0000"/>
+                    </a:gs>
+                  </a:gsLst>
+                  <a:lin ang="5400000" scaled="0"/>
+                </a:gradFill>
+                <a:effectLst>
+                  <a:glow>
+                    <a:srgbClr val="FFC000">
+                      <a:alpha val="66000"/>
+                    </a:srgbClr>
+                  </a:glow>
+                  <a:outerShdw dist="50800" dir="5400000" algn="br" rotWithShape="0">
+                    <a:schemeClr val="bg1"/>
+                  </a:outerShdw>
+                </a:effectLst>
+                <a:latin typeface="Hermes" pitchFamily="50" charset="0"/>
+              </a:rPr>
+              <a:t> gliKch </a:t>
+            </a:r>
+            <a:endParaRPr lang="en-US" sz="1800" dirty="0">
+              <a:ln>
+                <a:solidFill>
+                  <a:schemeClr val="bg1"/>
+                </a:solidFill>
+              </a:ln>
+              <a:gradFill>
+                <a:gsLst>
+                  <a:gs pos="87000">
+                    <a:srgbClr val="FFC000"/>
+                  </a:gs>
+                  <a:gs pos="0">
+                    <a:srgbClr val="FFC000"/>
+                  </a:gs>
+                  <a:gs pos="64000">
+                    <a:srgbClr val="C00000"/>
+                  </a:gs>
+                  <a:gs pos="21000">
+                    <a:srgbClr val="FF0000"/>
+                  </a:gs>
+                </a:gsLst>
+                <a:lin ang="5400000" scaled="0"/>
+              </a:gradFill>
+              <a:latin typeface="MS Shell Dlg 2" panose="020B0604030504040204" pitchFamily="34" charset="0"/>
+            </a:endParaRPr>
+          </a:p>
+        </p:txBody>
+      </p:sp>
+      <p:pic>
+        <p:nvPicPr>
+          <p:cNvPr id="19" name="Picture 18">
+            <a:extLst>
+              <a:ext uri="{FF2B5EF4-FFF2-40B4-BE49-F238E27FC236}">
+                <a16:creationId xmlns:a16="http://schemas.microsoft.com/office/drawing/2014/main" id="{386BB507-3FEE-4EA9-A637-967B9770AE75}"/>
+              </a:ext>
+            </a:extLst>
+          </p:cNvPr>
+          <p:cNvPicPr>
+            <a:picLocks noChangeAspect="1"/>
+          </p:cNvPicPr>
+          <p:nvPr/>
+        </p:nvPicPr>
+        <p:blipFill rotWithShape="1">
+          <a:blip r:embed="rId3">
+            <a:extLst>
+              <a:ext uri="{28A0092B-C50C-407E-A947-70E740481C1C}">
+                <a14:useLocalDpi xmlns:a14="http://schemas.microsoft.com/office/drawing/2010/main" val="0"/>
+              </a:ext>
+            </a:extLst>
+          </a:blip>
+          <a:srcRect t="31472" b="-1"/>
+          <a:stretch/>
+        </p:blipFill>
+        <p:spPr>
+          <a:xfrm>
+            <a:off x="1011354" y="4133372"/>
+            <a:ext cx="9681287" cy="2159947"/>
+          </a:xfrm>
+          <a:prstGeom prst="rect">
+            <a:avLst/>
+          </a:prstGeom>
+        </p:spPr>
+      </p:pic>
+    </p:spTree>
+    <p:extLst>
+      <p:ext uri="{BB962C8B-B14F-4D97-AF65-F5344CB8AC3E}">
+        <p14:creationId xmlns:p14="http://schemas.microsoft.com/office/powerpoint/2010/main" val="3162062638"/>
+      </p:ext>
+    </p:extLst>
+  </p:cSld>
+  <p:clrMapOvr>
+    <a:masterClrMapping/>
+  </p:clrMapOvr>
+</p:sld>
+</file>
+
+<file path=ppt/slides/slide2.xml><?xml version="1.0" encoding="utf-8"?>
+<p:sld xmlns:a="http://schemas.openxmlformats.org/drawingml/2006/main" xmlns:r="http://schemas.openxmlformats.org/officeDocument/2006/relationships" xmlns:p="http://schemas.openxmlformats.org/presentationml/2006/main">
+  <p:cSld>
+    <p:spTree>
+      <p:nvGrpSpPr>
+        <p:cNvPr id="1" name=""/>
+        <p:cNvGrpSpPr/>
+        <p:nvPr/>
+      </p:nvGrpSpPr>
+      <p:grpSpPr>
+        <a:xfrm>
+          <a:off x="0" y="0"/>
+          <a:ext cx="0" cy="0"/>
+          <a:chOff x="0" y="0"/>
+          <a:chExt cx="0" cy="0"/>
+        </a:xfrm>
+      </p:grpSpPr>
+      <p:sp>
+        <p:nvSpPr>
+          <p:cNvPr id="7" name="Rectangle 6">
+            <a:extLst>
+              <a:ext uri="{FF2B5EF4-FFF2-40B4-BE49-F238E27FC236}">
+                <a16:creationId xmlns:a16="http://schemas.microsoft.com/office/drawing/2014/main" id="{5FF0A3BB-F8A7-4A6F-997E-2C949CEB3F56}"/>
+              </a:ext>
+            </a:extLst>
+          </p:cNvPr>
+          <p:cNvSpPr/>
+          <p:nvPr/>
+        </p:nvSpPr>
+        <p:spPr>
+          <a:xfrm>
+            <a:off x="4476387" y="274290"/>
+            <a:ext cx="3759363" cy="1446550"/>
+          </a:xfrm>
+          <a:prstGeom prst="rect">
+            <a:avLst/>
+          </a:prstGeom>
+          <a:noFill/>
+        </p:spPr>
+        <p:txBody>
+          <a:bodyPr wrap="none" lIns="91440" tIns="45720" rIns="91440" bIns="45720">
+            <a:spAutoFit/>
+            <a:scene3d>
+              <a:camera prst="orthographicFront"/>
+              <a:lightRig rig="threePt" dir="t"/>
+            </a:scene3d>
+            <a:sp3d>
+              <a:extrusionClr>
+                <a:srgbClr val="FFFF00"/>
+              </a:extrusionClr>
+              <a:contourClr>
+                <a:srgbClr val="FFFF00"/>
+              </a:contourClr>
+            </a:sp3d>
+          </a:bodyPr>
+          <a:lstStyle/>
+          <a:p>
+            <a:pPr algn="ctr"/>
+            <a:r>
+              <a:rPr lang="en-US" sz="8800" dirty="0" err="1">
                 <a:ln w="19050">
                   <a:solidFill>
                     <a:srgbClr val="FFFF00"/>
@@ -8556,9 +8734,9 @@
                 </a:effectLst>
                 <a:latin typeface="Hermes" pitchFamily="50" charset="0"/>
               </a:rPr>
-              <a:t>About</a:t>
+              <a:t>AbouT</a:t>
             </a:r>
-            <a:endParaRPr lang="en-US" sz="1800" dirty="0">
+            <a:endParaRPr lang="en-US" sz="1050" dirty="0">
               <a:gradFill>
                 <a:gsLst>
                   <a:gs pos="65000">
@@ -8584,45 +8762,10 @@
           </a:p>
         </p:txBody>
       </p:sp>
-      <p:pic>
-        <p:nvPicPr>
-          <p:cNvPr id="19" name="Picture 18">
-            <a:extLst>
-              <a:ext uri="{FF2B5EF4-FFF2-40B4-BE49-F238E27FC236}">
-                <a16:creationId xmlns:a16="http://schemas.microsoft.com/office/drawing/2014/main" id="{386BB507-3FEE-4EA9-A637-967B9770AE75}"/>
-              </a:ext>
-            </a:extLst>
-          </p:cNvPr>
-          <p:cNvPicPr>
-            <a:picLocks noChangeAspect="1"/>
-          </p:cNvPicPr>
-          <p:nvPr/>
-        </p:nvPicPr>
-        <p:blipFill rotWithShape="1">
-          <a:blip r:embed="rId3">
-            <a:extLst>
-              <a:ext uri="{28A0092B-C50C-407E-A947-70E740481C1C}">
-                <a14:useLocalDpi xmlns:a14="http://schemas.microsoft.com/office/drawing/2010/main" val="0"/>
-              </a:ext>
-            </a:extLst>
-          </a:blip>
-          <a:srcRect t="31472" b="-1"/>
-          <a:stretch/>
-        </p:blipFill>
-        <p:spPr>
-          <a:xfrm>
-            <a:off x="1011354" y="4133372"/>
-            <a:ext cx="9681287" cy="2159947"/>
-          </a:xfrm>
-          <a:prstGeom prst="rect">
-            <a:avLst/>
-          </a:prstGeom>
-        </p:spPr>
-      </p:pic>
     </p:spTree>
     <p:extLst>
       <p:ext uri="{BB962C8B-B14F-4D97-AF65-F5344CB8AC3E}">
-        <p14:creationId xmlns:p14="http://schemas.microsoft.com/office/powerpoint/2010/main" val="3162062638"/>
+        <p14:creationId xmlns:p14="http://schemas.microsoft.com/office/powerpoint/2010/main" val="173586250"/>
       </p:ext>
     </p:extLst>
   </p:cSld>
@@ -8823,7 +8966,70 @@
       </a:bgFillStyleLst>
     </a:fmtScheme>
   </a:themeElements>
-  <a:objectDefaults/>
+  <a:objectDefaults>
+    <a:spDef>
+      <a:spPr>
+        <a:noFill/>
+      </a:spPr>
+      <a:bodyPr wrap="none" lIns="91440" tIns="45720" rIns="91440" bIns="45720">
+        <a:spAutoFit/>
+        <a:scene3d>
+          <a:camera prst="orthographicFront"/>
+          <a:lightRig rig="threePt" dir="t"/>
+        </a:scene3d>
+        <a:sp3d>
+          <a:extrusionClr>
+            <a:srgbClr val="FFFF00"/>
+          </a:extrusionClr>
+          <a:contourClr>
+            <a:srgbClr val="FFFF00"/>
+          </a:contourClr>
+        </a:sp3d>
+      </a:bodyPr>
+      <a:lstStyle>
+        <a:defPPr algn="ctr">
+          <a:defRPr sz="19900" b="0" cap="none" spc="0" dirty="0" smtClean="0">
+            <a:ln w="19050">
+              <a:solidFill>
+                <a:srgbClr val="FFFF00"/>
+              </a:solidFill>
+            </a:ln>
+            <a:gradFill>
+              <a:gsLst>
+                <a:gs pos="65000">
+                  <a:srgbClr val="FFC000"/>
+                </a:gs>
+                <a:gs pos="87000">
+                  <a:srgbClr val="FFC000"/>
+                </a:gs>
+                <a:gs pos="86000">
+                  <a:srgbClr val="C84916"/>
+                </a:gs>
+                <a:gs pos="0">
+                  <a:srgbClr val="FFFF00"/>
+                </a:gs>
+                <a:gs pos="33000">
+                  <a:srgbClr val="C00000"/>
+                </a:gs>
+              </a:gsLst>
+              <a:lin ang="5400000" scaled="0"/>
+            </a:gradFill>
+            <a:effectLst>
+              <a:glow>
+                <a:srgbClr val="FFC000">
+                  <a:alpha val="66000"/>
+                </a:srgbClr>
+              </a:glow>
+              <a:outerShdw dist="50800" dir="5400000" algn="br" rotWithShape="0">
+                <a:schemeClr val="bg1"/>
+              </a:outerShdw>
+            </a:effectLst>
+            <a:latin typeface="Hermes" pitchFamily="50" charset="0"/>
+          </a:defRPr>
+        </a:defPPr>
+      </a:lstStyle>
+    </a:spDef>
+  </a:objectDefaults>
   <a:extraClrSchemeLst/>
   <a:extLst>
     <a:ext uri="{05A4C25C-085E-4340-85A3-A5531E510DB2}">

</xml_diff>

<commit_message>
GK_UPG 11/20/20 Re-Format / IMG
</commit_message>
<xml_diff>
--- a/GKPPROJ/GK_LOGOS.pptx
+++ b/GKPPROJ/GK_LOGOS.pptx
@@ -7,6 +7,7 @@
   <p:sldIdLst>
     <p:sldId id="256" r:id="rId2"/>
     <p:sldId id="258" r:id="rId3"/>
+    <p:sldId id="259" r:id="rId4"/>
   </p:sldIdLst>
   <p:sldSz cx="12192000" cy="6858000"/>
   <p:notesSz cx="6858000" cy="9144000"/>
@@ -113,6 +114,18 @@
 </p:presentation>
 </file>
 
+<file path=ppt/commentAuthors.xml><?xml version="1.0" encoding="utf-8"?>
+<p:cmAuthorLst xmlns:a="http://schemas.openxmlformats.org/drawingml/2006/main" xmlns:r="http://schemas.openxmlformats.org/officeDocument/2006/relationships" xmlns:p="http://schemas.openxmlformats.org/presentationml/2006/main">
+  <p:cmAuthor id="1" name="Joel De Alba" initials="JDA" lastIdx="1" clrIdx="0">
+    <p:extLst>
+      <p:ext uri="{19B8F6BF-5375-455C-9EA6-DF929625EA0E}">
+        <p15:presenceInfo xmlns:p15="http://schemas.microsoft.com/office/powerpoint/2012/main" userId="5d8b35521cac460b" providerId="Windows Live"/>
+      </p:ext>
+    </p:extLst>
+  </p:cmAuthor>
+</p:cmAuthorLst>
+</file>
+
 <file path=ppt/slideLayouts/slideLayout1.xml><?xml version="1.0" encoding="utf-8"?>
 <p:sldLayout xmlns:a="http://schemas.openxmlformats.org/drawingml/2006/main" xmlns:r="http://schemas.openxmlformats.org/officeDocument/2006/relationships" xmlns:p="http://schemas.openxmlformats.org/presentationml/2006/main" type="title" preserve="1">
   <p:cSld name="Title Slide">
@@ -278,7 +291,7 @@
           <a:p>
             <a:fld id="{72EA7947-E287-4738-8C82-07CE4F01EF03}" type="datetime2">
               <a:rPr lang="en-US" smtClean="0"/>
-              <a:t>Thursday, October 29, 2020</a:t>
+              <a:t>Tuesday, November 17, 2020</a:t>
             </a:fld>
             <a:endParaRPr lang="en-US" dirty="0"/>
           </a:p>
@@ -1314,7 +1327,7 @@
           <a:p>
             <a:fld id="{EE2EBD84-71F4-4271-8C46-0D47C0A9B12E}" type="datetime2">
               <a:rPr lang="en-US" smtClean="0"/>
-              <a:t>Thursday, October 29, 2020</a:t>
+              <a:t>Tuesday, November 17, 2020</a:t>
             </a:fld>
             <a:endParaRPr lang="en-US"/>
           </a:p>
@@ -1525,7 +1538,7 @@
           <a:p>
             <a:fld id="{ABAE0CE1-F450-4107-B2CB-17B18F8A3F4A}" type="datetime2">
               <a:rPr lang="en-US" smtClean="0"/>
-              <a:t>Thursday, October 29, 2020</a:t>
+              <a:t>Tuesday, November 17, 2020</a:t>
             </a:fld>
             <a:endParaRPr lang="en-US"/>
           </a:p>
@@ -2190,7 +2203,7 @@
           <a:p>
             <a:fld id="{6FE8C025-CD7A-4966-867E-81CF82B15267}" type="datetime2">
               <a:rPr lang="en-US" smtClean="0"/>
-              <a:t>Thursday, October 29, 2020</a:t>
+              <a:t>Tuesday, November 17, 2020</a:t>
             </a:fld>
             <a:endParaRPr lang="en-US"/>
           </a:p>
@@ -2810,7 +2823,7 @@
           <a:p>
             <a:fld id="{FE809929-0719-4517-94D6-FDF7F99E70F6}" type="datetime2">
               <a:rPr lang="en-US" smtClean="0"/>
-              <a:t>Thursday, October 29, 2020</a:t>
+              <a:t>Tuesday, November 17, 2020</a:t>
             </a:fld>
             <a:endParaRPr lang="en-US"/>
           </a:p>
@@ -3928,7 +3941,7 @@
           <a:p>
             <a:fld id="{20E95673-5512-4AAA-9AEB-E00C61EC65D5}" type="datetime2">
               <a:rPr lang="en-US" smtClean="0"/>
-              <a:t>Thursday, October 29, 2020</a:t>
+              <a:t>Tuesday, November 17, 2020</a:t>
             </a:fld>
             <a:endParaRPr lang="en-US"/>
           </a:p>
@@ -4475,7 +4488,7 @@
           <a:p>
             <a:fld id="{C13138FA-2E87-4873-8BBA-13E447C9A99A}" type="datetime2">
               <a:rPr lang="en-US" smtClean="0"/>
-              <a:t>Thursday, October 29, 2020</a:t>
+              <a:t>Tuesday, November 17, 2020</a:t>
             </a:fld>
             <a:endParaRPr lang="en-US"/>
           </a:p>
@@ -4636,7 +4649,7 @@
           <a:p>
             <a:fld id="{D75BB40A-97BD-4BFB-B639-0BFF95FDE8B7}" type="datetime2">
               <a:rPr lang="en-US" smtClean="0"/>
-              <a:t>Thursday, October 29, 2020</a:t>
+              <a:t>Tuesday, November 17, 2020</a:t>
             </a:fld>
             <a:endParaRPr lang="en-US"/>
           </a:p>
@@ -5671,7 +5684,7 @@
           <a:p>
             <a:fld id="{9EE9E0E3-ECF6-4CFE-8698-AEFEBCECC3C0}" type="datetime2">
               <a:rPr lang="en-US" smtClean="0"/>
-              <a:t>Thursday, October 29, 2020</a:t>
+              <a:t>Tuesday, November 17, 2020</a:t>
             </a:fld>
             <a:endParaRPr lang="en-US"/>
           </a:p>
@@ -6317,7 +6330,7 @@
           <a:p>
             <a:fld id="{251462FC-960E-4740-921F-B36862979F21}" type="datetime2">
               <a:rPr lang="en-US" smtClean="0"/>
-              <a:t>Thursday, October 29, 2020</a:t>
+              <a:t>Tuesday, November 17, 2020</a:t>
             </a:fld>
             <a:endParaRPr lang="en-US"/>
           </a:p>
@@ -7081,7 +7094,7 @@
           <a:p>
             <a:fld id="{E50BC9E2-CB44-4C05-9BB5-496C18A241E0}" type="datetime2">
               <a:rPr lang="en-US" smtClean="0"/>
-              <a:t>Thursday, October 29, 2020</a:t>
+              <a:t>Tuesday, November 17, 2020</a:t>
             </a:fld>
             <a:endParaRPr lang="en-US"/>
           </a:p>
@@ -7334,7 +7347,7 @@
           <a:p>
             <a:fld id="{246CB39B-5F4C-4A7E-9BE3-AAFD45576D16}" type="datetime2">
               <a:rPr lang="en-US" smtClean="0"/>
-              <a:t>Thursday, October 29, 2020</a:t>
+              <a:t>Tuesday, November 17, 2020</a:t>
             </a:fld>
             <a:endParaRPr lang="en-US" dirty="0"/>
           </a:p>
@@ -8496,8 +8509,8 @@
         </p:nvSpPr>
         <p:spPr>
           <a:xfrm>
-            <a:off x="1152919" y="547490"/>
-            <a:ext cx="9467656" cy="3154710"/>
+            <a:off x="877202" y="547490"/>
+            <a:ext cx="10019089" cy="3154710"/>
           </a:xfrm>
           <a:prstGeom prst="rect">
             <a:avLst/>
@@ -8508,7 +8521,7 @@
           <a:bodyPr wrap="none" lIns="91440" tIns="45720" rIns="91440" bIns="45720">
             <a:spAutoFit/>
             <a:scene3d>
-              <a:camera prst="orthographicFront"/>
+              <a:camera prst="perspectiveHeroicExtremeRightFacing"/>
               <a:lightRig rig="threePt" dir="t"/>
             </a:scene3d>
             <a:sp3d>
@@ -8524,25 +8537,22 @@
           <a:p>
             <a:pPr algn="ctr"/>
             <a:r>
-              <a:rPr lang="en-US" sz="19900" b="0" cap="none" spc="0" dirty="0">
+              <a:rPr lang="en-US" sz="19900" b="1" dirty="0">
                 <a:ln w="19050">
-                  <a:solidFill>
-                    <a:schemeClr val="bg1"/>
-                  </a:solidFill>
+                  <a:noFill/>
                 </a:ln>
                 <a:gradFill>
                   <a:gsLst>
-                    <a:gs pos="87000">
+                    <a:gs pos="100000">
+                      <a:schemeClr val="accent1"/>
+                    </a:gs>
+                    <a:gs pos="12389">
                       <a:srgbClr val="FFC000"/>
                     </a:gs>
-                    <a:gs pos="0">
-                      <a:srgbClr val="FFC000"/>
-                    </a:gs>
-                    <a:gs pos="64000">
-                      <a:srgbClr val="C00000"/>
-                    </a:gs>
-                    <a:gs pos="21000">
-                      <a:srgbClr val="FF0000"/>
+                    <a:gs pos="54000">
+                      <a:schemeClr val="accent4">
+                        <a:lumMod val="75000"/>
+                      </a:schemeClr>
                     </a:gs>
                   </a:gsLst>
                   <a:lin ang="5400000" scaled="0"/>
@@ -8553,33 +8563,24 @@
                       <a:alpha val="66000"/>
                     </a:srgbClr>
                   </a:glow>
-                  <a:outerShdw dist="50800" dir="5400000" algn="br" rotWithShape="0">
-                    <a:schemeClr val="bg1"/>
-                  </a:outerShdw>
                 </a:effectLst>
                 <a:latin typeface="Hermes" pitchFamily="50" charset="0"/>
               </a:rPr>
               <a:t> gliKch </a:t>
             </a:r>
-            <a:endParaRPr lang="en-US" sz="1800" dirty="0">
-              <a:ln>
-                <a:solidFill>
-                  <a:schemeClr val="bg1"/>
-                </a:solidFill>
-              </a:ln>
+            <a:endParaRPr lang="en-US" b="1" dirty="0">
               <a:gradFill>
                 <a:gsLst>
-                  <a:gs pos="87000">
+                  <a:gs pos="100000">
+                    <a:schemeClr val="accent1"/>
+                  </a:gs>
+                  <a:gs pos="12389">
                     <a:srgbClr val="FFC000"/>
                   </a:gs>
-                  <a:gs pos="0">
-                    <a:srgbClr val="FFC000"/>
-                  </a:gs>
-                  <a:gs pos="64000">
-                    <a:srgbClr val="C00000"/>
-                  </a:gs>
-                  <a:gs pos="21000">
-                    <a:srgbClr val="FF0000"/>
+                  <a:gs pos="54000">
+                    <a:schemeClr val="accent4">
+                      <a:lumMod val="75000"/>
+                    </a:schemeClr>
                   </a:gs>
                 </a:gsLst>
                 <a:lin ang="5400000" scaled="0"/>
@@ -8616,7 +8617,7 @@
         </p:blipFill>
         <p:spPr>
           <a:xfrm>
-            <a:off x="1011354" y="4133372"/>
+            <a:off x="1117231" y="4200126"/>
             <a:ext cx="9681287" cy="2159947"/>
           </a:xfrm>
           <a:prstGeom prst="rect">
@@ -9277,45 +9278,512 @@
 </p:sld>
 </file>
 
+<file path=ppt/slides/slide3.xml><?xml version="1.0" encoding="utf-8"?>
+<p:sld xmlns:a="http://schemas.openxmlformats.org/drawingml/2006/main" xmlns:r="http://schemas.openxmlformats.org/officeDocument/2006/relationships" xmlns:p="http://schemas.openxmlformats.org/presentationml/2006/main">
+  <p:cSld>
+    <p:spTree>
+      <p:nvGrpSpPr>
+        <p:cNvPr id="1" name=""/>
+        <p:cNvGrpSpPr/>
+        <p:nvPr/>
+      </p:nvGrpSpPr>
+      <p:grpSpPr>
+        <a:xfrm>
+          <a:off x="0" y="0"/>
+          <a:ext cx="0" cy="0"/>
+          <a:chOff x="0" y="0"/>
+          <a:chExt cx="0" cy="0"/>
+        </a:xfrm>
+      </p:grpSpPr>
+      <p:sp>
+        <p:nvSpPr>
+          <p:cNvPr id="6" name="Rectangle 5">
+            <a:extLst>
+              <a:ext uri="{FF2B5EF4-FFF2-40B4-BE49-F238E27FC236}">
+                <a16:creationId xmlns:a16="http://schemas.microsoft.com/office/drawing/2014/main" id="{A2C42153-06E1-4920-8B79-BE2E43B5949E}"/>
+              </a:ext>
+            </a:extLst>
+          </p:cNvPr>
+          <p:cNvSpPr/>
+          <p:nvPr/>
+        </p:nvSpPr>
+        <p:spPr>
+          <a:xfrm>
+            <a:off x="2039709" y="2601575"/>
+            <a:ext cx="4273927" cy="1107996"/>
+          </a:xfrm>
+          <a:prstGeom prst="rect">
+            <a:avLst/>
+          </a:prstGeom>
+          <a:noFill/>
+        </p:spPr>
+        <p:txBody>
+          <a:bodyPr wrap="none" lIns="91440" tIns="45720" rIns="91440" bIns="45720">
+            <a:spAutoFit/>
+            <a:scene3d>
+              <a:camera prst="perspectiveHeroicExtremeRightFacing">
+                <a:rot lat="21498043" lon="19892420" rev="341736"/>
+              </a:camera>
+              <a:lightRig rig="threePt" dir="t"/>
+            </a:scene3d>
+            <a:sp3d extrusionH="95250" prstMaterial="dkEdge">
+              <a:bevelT w="0" h="0" prst="angle"/>
+              <a:extrusionClr>
+                <a:schemeClr val="accent4">
+                  <a:lumMod val="75000"/>
+                </a:schemeClr>
+              </a:extrusionClr>
+              <a:contourClr>
+                <a:srgbClr val="C00000"/>
+              </a:contourClr>
+            </a:sp3d>
+          </a:bodyPr>
+          <a:lstStyle/>
+          <a:p>
+            <a:pPr algn="ctr"/>
+            <a:r>
+              <a:rPr lang="en-US" sz="6600" b="1" i="1" dirty="0">
+                <a:ln w="9525">
+                  <a:solidFill>
+                    <a:schemeClr val="bg1"/>
+                  </a:solidFill>
+                  <a:prstDash val="solid"/>
+                </a:ln>
+                <a:gradFill>
+                  <a:gsLst>
+                    <a:gs pos="88000">
+                      <a:schemeClr val="accent4">
+                        <a:lumMod val="75000"/>
+                      </a:schemeClr>
+                    </a:gs>
+                    <a:gs pos="21000">
+                      <a:srgbClr val="FFC000"/>
+                    </a:gs>
+                    <a:gs pos="100000">
+                      <a:srgbClr val="FF0000"/>
+                    </a:gs>
+                  </a:gsLst>
+                  <a:lin ang="5400000" scaled="1"/>
+                </a:gradFill>
+                <a:effectLst>
+                  <a:outerShdw blurRad="12700" dist="38100" dir="2700000" algn="tl" rotWithShape="0">
+                    <a:schemeClr val="bg1">
+                      <a:lumMod val="50000"/>
+                    </a:schemeClr>
+                  </a:outerShdw>
+                </a:effectLst>
+                <a:latin typeface="EA Logo" panose="00000400000000000000" pitchFamily="2" charset="0"/>
+              </a:rPr>
+              <a:t> G l I K C H</a:t>
+            </a:r>
+            <a:endParaRPr lang="en-US" sz="6600" b="0" i="1" cap="none" spc="0" dirty="0">
+              <a:ln w="0"/>
+              <a:gradFill>
+                <a:gsLst>
+                  <a:gs pos="88000">
+                    <a:schemeClr val="accent4">
+                      <a:lumMod val="75000"/>
+                    </a:schemeClr>
+                  </a:gs>
+                  <a:gs pos="21000">
+                    <a:srgbClr val="FFC000"/>
+                  </a:gs>
+                  <a:gs pos="100000">
+                    <a:srgbClr val="FF0000"/>
+                  </a:gs>
+                </a:gsLst>
+                <a:lin ang="5400000" scaled="1"/>
+              </a:gradFill>
+              <a:effectLst>
+                <a:outerShdw blurRad="38100" dist="19050" dir="2700000" algn="tl" rotWithShape="0">
+                  <a:schemeClr val="dk1">
+                    <a:alpha val="40000"/>
+                  </a:schemeClr>
+                </a:outerShdw>
+              </a:effectLst>
+              <a:latin typeface="EA Logo" panose="00000400000000000000" pitchFamily="2" charset="0"/>
+            </a:endParaRPr>
+          </a:p>
+        </p:txBody>
+      </p:sp>
+      <p:sp>
+        <p:nvSpPr>
+          <p:cNvPr id="11" name="Rectangle 10">
+            <a:extLst>
+              <a:ext uri="{FF2B5EF4-FFF2-40B4-BE49-F238E27FC236}">
+                <a16:creationId xmlns:a16="http://schemas.microsoft.com/office/drawing/2014/main" id="{14BE8D71-6344-4D02-91C3-DC9B8F8AD1DA}"/>
+              </a:ext>
+            </a:extLst>
+          </p:cNvPr>
+          <p:cNvSpPr/>
+          <p:nvPr/>
+        </p:nvSpPr>
+        <p:spPr>
+          <a:xfrm>
+            <a:off x="1776014" y="4343400"/>
+            <a:ext cx="4801315" cy="923330"/>
+          </a:xfrm>
+          <a:prstGeom prst="rect">
+            <a:avLst/>
+          </a:prstGeom>
+          <a:noFill/>
+        </p:spPr>
+        <p:txBody>
+          <a:bodyPr wrap="none" lIns="91440" tIns="45720" rIns="91440" bIns="45720">
+            <a:spAutoFit/>
+            <a:scene3d>
+              <a:camera prst="perspectiveHeroicExtremeRightFacing">
+                <a:rot lat="21498043" lon="19892420" rev="341736"/>
+              </a:camera>
+              <a:lightRig rig="threePt" dir="t">
+                <a:rot lat="0" lon="0" rev="4200000"/>
+              </a:lightRig>
+            </a:scene3d>
+            <a:sp3d extrusionH="152400" prstMaterial="dkEdge">
+              <a:bevelT w="0" h="0" prst="angle"/>
+              <a:extrusionClr>
+                <a:srgbClr val="FF0000"/>
+              </a:extrusionClr>
+              <a:contourClr>
+                <a:schemeClr val="bg1"/>
+              </a:contourClr>
+            </a:sp3d>
+          </a:bodyPr>
+          <a:lstStyle/>
+          <a:p>
+            <a:pPr algn="ctr"/>
+            <a:r>
+              <a:rPr lang="en-US" sz="5400" b="1" i="1" dirty="0">
+                <a:ln w="9525">
+                  <a:solidFill>
+                    <a:schemeClr val="bg1"/>
+                  </a:solidFill>
+                  <a:prstDash val="solid"/>
+                </a:ln>
+                <a:gradFill>
+                  <a:gsLst>
+                    <a:gs pos="88000">
+                      <a:schemeClr val="accent4">
+                        <a:lumMod val="75000"/>
+                      </a:schemeClr>
+                    </a:gs>
+                    <a:gs pos="21000">
+                      <a:srgbClr val="FFC000"/>
+                    </a:gs>
+                    <a:gs pos="100000">
+                      <a:srgbClr val="FF0000"/>
+                    </a:gs>
+                  </a:gsLst>
+                  <a:lin ang="5400000" scaled="1"/>
+                </a:gradFill>
+                <a:effectLst>
+                  <a:outerShdw blurRad="12700" dist="38100" dir="2700000" algn="tl" rotWithShape="0">
+                    <a:schemeClr val="bg1">
+                      <a:lumMod val="50000"/>
+                    </a:schemeClr>
+                  </a:outerShdw>
+                </a:effectLst>
+                <a:latin typeface="CF Glitch City" pitchFamily="2" charset="0"/>
+              </a:rPr>
+              <a:t> G L I K C H</a:t>
+            </a:r>
+            <a:endParaRPr lang="en-US" sz="5400" b="0" i="1" cap="none" spc="0" dirty="0">
+              <a:ln w="0"/>
+              <a:gradFill>
+                <a:gsLst>
+                  <a:gs pos="88000">
+                    <a:schemeClr val="accent4">
+                      <a:lumMod val="75000"/>
+                    </a:schemeClr>
+                  </a:gs>
+                  <a:gs pos="21000">
+                    <a:srgbClr val="FFC000"/>
+                  </a:gs>
+                  <a:gs pos="100000">
+                    <a:srgbClr val="FF0000"/>
+                  </a:gs>
+                </a:gsLst>
+                <a:lin ang="5400000" scaled="1"/>
+              </a:gradFill>
+              <a:effectLst>
+                <a:outerShdw blurRad="38100" dist="19050" dir="2700000" algn="tl" rotWithShape="0">
+                  <a:schemeClr val="dk1">
+                    <a:alpha val="40000"/>
+                  </a:schemeClr>
+                </a:outerShdw>
+              </a:effectLst>
+              <a:latin typeface="CF Glitch City" pitchFamily="2" charset="0"/>
+            </a:endParaRPr>
+          </a:p>
+        </p:txBody>
+      </p:sp>
+      <p:sp>
+        <p:nvSpPr>
+          <p:cNvPr id="15" name="Rectangle 14">
+            <a:extLst>
+              <a:ext uri="{FF2B5EF4-FFF2-40B4-BE49-F238E27FC236}">
+                <a16:creationId xmlns:a16="http://schemas.microsoft.com/office/drawing/2014/main" id="{3EF7B90B-E289-40AB-82FD-62F7B7B21748}"/>
+              </a:ext>
+            </a:extLst>
+          </p:cNvPr>
+          <p:cNvSpPr/>
+          <p:nvPr/>
+        </p:nvSpPr>
+        <p:spPr>
+          <a:xfrm>
+            <a:off x="7113481" y="2214613"/>
+            <a:ext cx="3079689" cy="923330"/>
+          </a:xfrm>
+          <a:prstGeom prst="rect">
+            <a:avLst/>
+          </a:prstGeom>
+          <a:noFill/>
+          <a:scene3d>
+            <a:camera prst="perspectiveHeroicExtremeRightFacing">
+              <a:rot lat="21498043" lon="19892420" rev="341736"/>
+            </a:camera>
+            <a:lightRig rig="threePt" dir="t">
+              <a:rot lat="0" lon="0" rev="4200000"/>
+            </a:lightRig>
+          </a:scene3d>
+          <a:sp3d/>
+        </p:spPr>
+        <p:txBody>
+          <a:bodyPr wrap="none" lIns="91440" tIns="45720" rIns="91440" bIns="45720">
+            <a:spAutoFit/>
+            <a:sp3d extrusionH="88900" prstMaterial="dkEdge">
+              <a:bevelT w="0" h="0" prst="angle"/>
+              <a:extrusionClr>
+                <a:schemeClr val="tx1">
+                  <a:lumMod val="50000"/>
+                </a:schemeClr>
+              </a:extrusionClr>
+              <a:contourClr>
+                <a:schemeClr val="accent1"/>
+              </a:contourClr>
+            </a:sp3d>
+          </a:bodyPr>
+          <a:lstStyle/>
+          <a:p>
+            <a:pPr algn="ctr"/>
+            <a:r>
+              <a:rPr lang="en-US" sz="5400" b="1" i="1" dirty="0">
+                <a:ln w="9525">
+                  <a:solidFill>
+                    <a:schemeClr val="bg1"/>
+                  </a:solidFill>
+                  <a:prstDash val="solid"/>
+                </a:ln>
+                <a:gradFill>
+                  <a:gsLst>
+                    <a:gs pos="88000">
+                      <a:srgbClr val="C00000"/>
+                    </a:gs>
+                    <a:gs pos="35000">
+                      <a:schemeClr val="accent2">
+                        <a:lumMod val="75000"/>
+                      </a:schemeClr>
+                    </a:gs>
+                    <a:gs pos="0">
+                      <a:schemeClr val="accent4">
+                        <a:lumMod val="75000"/>
+                      </a:schemeClr>
+                    </a:gs>
+                  </a:gsLst>
+                  <a:lin ang="5400000" scaled="1"/>
+                </a:gradFill>
+                <a:latin typeface="BravAda Arma" panose="00000400000000000000" pitchFamily="2" charset="0"/>
+              </a:rPr>
+              <a:t> G L I K C H</a:t>
+            </a:r>
+            <a:endParaRPr lang="en-US" sz="5400" b="0" i="1" cap="none" spc="0" dirty="0">
+              <a:ln w="0"/>
+              <a:gradFill>
+                <a:gsLst>
+                  <a:gs pos="88000">
+                    <a:srgbClr val="C00000"/>
+                  </a:gs>
+                  <a:gs pos="35000">
+                    <a:schemeClr val="accent2">
+                      <a:lumMod val="75000"/>
+                    </a:schemeClr>
+                  </a:gs>
+                  <a:gs pos="0">
+                    <a:schemeClr val="accent4">
+                      <a:lumMod val="75000"/>
+                    </a:schemeClr>
+                  </a:gs>
+                </a:gsLst>
+                <a:lin ang="5400000" scaled="1"/>
+              </a:gradFill>
+              <a:latin typeface="BravAda Arma" panose="00000400000000000000" pitchFamily="2" charset="0"/>
+            </a:endParaRPr>
+          </a:p>
+        </p:txBody>
+      </p:sp>
+      <p:sp>
+        <p:nvSpPr>
+          <p:cNvPr id="17" name="Rectangle 16">
+            <a:extLst>
+              <a:ext uri="{FF2B5EF4-FFF2-40B4-BE49-F238E27FC236}">
+                <a16:creationId xmlns:a16="http://schemas.microsoft.com/office/drawing/2014/main" id="{6ED1106A-DD37-4963-8D58-966906CC64D0}"/>
+              </a:ext>
+            </a:extLst>
+          </p:cNvPr>
+          <p:cNvSpPr/>
+          <p:nvPr/>
+        </p:nvSpPr>
+        <p:spPr>
+          <a:xfrm>
+            <a:off x="7113481" y="3881735"/>
+            <a:ext cx="3079689" cy="923330"/>
+          </a:xfrm>
+          <a:prstGeom prst="rect">
+            <a:avLst/>
+          </a:prstGeom>
+          <a:noFill/>
+        </p:spPr>
+        <p:txBody>
+          <a:bodyPr wrap="none" lIns="91440" tIns="45720" rIns="91440" bIns="45720">
+            <a:spAutoFit/>
+            <a:scene3d>
+              <a:camera prst="perspectiveHeroicExtremeRightFacing">
+                <a:rot lat="21498043" lon="19892420" rev="341736"/>
+              </a:camera>
+              <a:lightRig rig="threePt" dir="t">
+                <a:rot lat="0" lon="0" rev="4200000"/>
+              </a:lightRig>
+            </a:scene3d>
+            <a:sp3d extrusionH="152400" prstMaterial="dkEdge">
+              <a:bevelT w="0" h="0" prst="angle"/>
+              <a:extrusionClr>
+                <a:srgbClr val="FF0000"/>
+              </a:extrusionClr>
+              <a:contourClr>
+                <a:schemeClr val="bg1"/>
+              </a:contourClr>
+            </a:sp3d>
+          </a:bodyPr>
+          <a:lstStyle/>
+          <a:p>
+            <a:pPr algn="ctr"/>
+            <a:r>
+              <a:rPr lang="en-US" sz="5400" b="1" i="1" dirty="0">
+                <a:ln w="9525">
+                  <a:solidFill>
+                    <a:schemeClr val="bg1"/>
+                  </a:solidFill>
+                  <a:prstDash val="solid"/>
+                </a:ln>
+                <a:gradFill>
+                  <a:gsLst>
+                    <a:gs pos="88000">
+                      <a:schemeClr val="accent4">
+                        <a:lumMod val="75000"/>
+                      </a:schemeClr>
+                    </a:gs>
+                    <a:gs pos="21000">
+                      <a:srgbClr val="FFC000"/>
+                    </a:gs>
+                    <a:gs pos="100000">
+                      <a:srgbClr val="FF0000"/>
+                    </a:gs>
+                  </a:gsLst>
+                  <a:lin ang="5400000" scaled="1"/>
+                </a:gradFill>
+                <a:effectLst>
+                  <a:outerShdw blurRad="12700" dist="38100" dir="2700000" algn="tl" rotWithShape="0">
+                    <a:schemeClr val="bg1">
+                      <a:lumMod val="50000"/>
+                    </a:schemeClr>
+                  </a:outerShdw>
+                </a:effectLst>
+                <a:latin typeface="BravAda Arma" panose="00000400000000000000" pitchFamily="2" charset="0"/>
+              </a:rPr>
+              <a:t> G L I K C H</a:t>
+            </a:r>
+            <a:endParaRPr lang="en-US" sz="5400" b="0" i="1" cap="none" spc="0" dirty="0">
+              <a:ln w="0"/>
+              <a:gradFill>
+                <a:gsLst>
+                  <a:gs pos="88000">
+                    <a:schemeClr val="accent4">
+                      <a:lumMod val="75000"/>
+                    </a:schemeClr>
+                  </a:gs>
+                  <a:gs pos="21000">
+                    <a:srgbClr val="FFC000"/>
+                  </a:gs>
+                  <a:gs pos="100000">
+                    <a:srgbClr val="FF0000"/>
+                  </a:gs>
+                </a:gsLst>
+                <a:lin ang="5400000" scaled="1"/>
+              </a:gradFill>
+              <a:effectLst>
+                <a:outerShdw blurRad="38100" dist="19050" dir="2700000" algn="tl" rotWithShape="0">
+                  <a:schemeClr val="dk1">
+                    <a:alpha val="40000"/>
+                  </a:schemeClr>
+                </a:outerShdw>
+              </a:effectLst>
+              <a:latin typeface="BravAda Arma" panose="00000400000000000000" pitchFamily="2" charset="0"/>
+            </a:endParaRPr>
+          </a:p>
+        </p:txBody>
+      </p:sp>
+    </p:spTree>
+    <p:extLst>
+      <p:ext uri="{BB962C8B-B14F-4D97-AF65-F5344CB8AC3E}">
+        <p14:creationId xmlns:p14="http://schemas.microsoft.com/office/powerpoint/2010/main" val="1318022048"/>
+      </p:ext>
+    </p:extLst>
+  </p:cSld>
+  <p:clrMapOvr>
+    <a:masterClrMapping/>
+  </p:clrMapOvr>
+</p:sld>
+</file>
+
 <file path=ppt/theme/theme1.xml><?xml version="1.0" encoding="utf-8"?>
 <a:theme xmlns:a="http://schemas.openxmlformats.org/drawingml/2006/main" name="3DFloatVTI">
   <a:themeElements>
-    <a:clrScheme name="AnalogousFromDarkSeedLeftStep">
+    <a:clrScheme name="Red Orange">
       <a:dk1>
-        <a:srgbClr val="000000"/>
+        <a:sysClr val="windowText" lastClr="000000"/>
       </a:dk1>
       <a:lt1>
-        <a:srgbClr val="FFFFFF"/>
+        <a:sysClr val="window" lastClr="FFFFFF"/>
       </a:lt1>
       <a:dk2>
-        <a:srgbClr val="301B2C"/>
+        <a:srgbClr val="505046"/>
       </a:dk2>
       <a:lt2>
-        <a:srgbClr val="F0F3F2"/>
+        <a:srgbClr val="EEECE1"/>
       </a:lt2>
       <a:accent1>
-        <a:srgbClr val="D13E79"/>
+        <a:srgbClr val="E84C22"/>
       </a:accent1>
       <a:accent2>
-        <a:srgbClr val="C02DA5"/>
+        <a:srgbClr val="FFBD47"/>
       </a:accent2>
       <a:accent3>
-        <a:srgbClr val="AF3ED1"/>
+        <a:srgbClr val="B64926"/>
       </a:accent3>
       <a:accent4>
-        <a:srgbClr val="622FC0"/>
+        <a:srgbClr val="FF8427"/>
       </a:accent4>
       <a:accent5>
-        <a:srgbClr val="3E48D1"/>
+        <a:srgbClr val="CC9900"/>
       </a:accent5>
       <a:accent6>
-        <a:srgbClr val="2D74C0"/>
+        <a:srgbClr val="B22600"/>
       </a:accent6>
       <a:hlink>
-        <a:srgbClr val="4C3FBF"/>
+        <a:srgbClr val="CC9900"/>
       </a:hlink>
       <a:folHlink>
-        <a:srgbClr val="7F7F7F"/>
+        <a:srgbClr val="666699"/>
       </a:folHlink>
     </a:clrScheme>
     <a:fontScheme name="Float">

</xml_diff>